<commit_message>
Final Image Album Project
Final Image Album Project
</commit_message>
<xml_diff>
--- a/ImageAlbumProject/doc/ImageAlbumPresentation.pptx
+++ b/ImageAlbumProject/doc/ImageAlbumPresentation.pptx
@@ -9,8 +9,12 @@
     <p:sldId id="257" r:id="rId3"/>
     <p:sldId id="261" r:id="rId4"/>
     <p:sldId id="258" r:id="rId5"/>
-    <p:sldId id="259" r:id="rId6"/>
-    <p:sldId id="260" r:id="rId7"/>
+    <p:sldId id="262" r:id="rId6"/>
+    <p:sldId id="259" r:id="rId7"/>
+    <p:sldId id="260" r:id="rId8"/>
+    <p:sldId id="264" r:id="rId9"/>
+    <p:sldId id="265" r:id="rId10"/>
+    <p:sldId id="263" r:id="rId11"/>
   </p:sldIdLst>
   <p:sldSz cx="9144000" cy="6858000" type="screen4x3"/>
   <p:notesSz cx="6858000" cy="9144000"/>
@@ -3766,6 +3770,96 @@
   <p:clrMapOvr>
     <a:masterClrMapping/>
   </p:clrMapOvr>
+  <p:timing>
+    <p:tnLst>
+      <p:par>
+        <p:cTn id="1" dur="indefinite" restart="never" nodeType="tmRoot"/>
+      </p:par>
+    </p:tnLst>
+  </p:timing>
+</p:sld>
+</file>
+
+<file path=ppt/slides/slide10.xml><?xml version="1.0" encoding="utf-8"?>
+<p:sld xmlns:a="http://schemas.openxmlformats.org/drawingml/2006/main" xmlns:r="http://schemas.openxmlformats.org/officeDocument/2006/relationships" xmlns:p="http://schemas.openxmlformats.org/presentationml/2006/main">
+  <p:cSld>
+    <p:spTree>
+      <p:nvGrpSpPr>
+        <p:cNvPr id="1" name=""/>
+        <p:cNvGrpSpPr/>
+        <p:nvPr/>
+      </p:nvGrpSpPr>
+      <p:grpSpPr>
+        <a:xfrm>
+          <a:off x="0" y="0"/>
+          <a:ext cx="0" cy="0"/>
+          <a:chOff x="0" y="0"/>
+          <a:chExt cx="0" cy="0"/>
+        </a:xfrm>
+      </p:grpSpPr>
+      <p:sp>
+        <p:nvSpPr>
+          <p:cNvPr id="2" name="Title 1"/>
+          <p:cNvSpPr>
+            <a:spLocks noGrp="1"/>
+          </p:cNvSpPr>
+          <p:nvPr>
+            <p:ph type="title"/>
+          </p:nvPr>
+        </p:nvSpPr>
+        <p:spPr/>
+        <p:txBody>
+          <a:bodyPr/>
+          <a:lstStyle/>
+          <a:p>
+            <a:r>
+              <a:rPr lang="en-US" dirty="0" smtClean="0"/>
+              <a:t>Controller</a:t>
+            </a:r>
+            <a:endParaRPr lang="en-US" dirty="0"/>
+          </a:p>
+        </p:txBody>
+      </p:sp>
+      <p:sp>
+        <p:nvSpPr>
+          <p:cNvPr id="3" name="Content Placeholder 2"/>
+          <p:cNvSpPr>
+            <a:spLocks noGrp="1"/>
+          </p:cNvSpPr>
+          <p:nvPr>
+            <p:ph sz="quarter" idx="1"/>
+          </p:nvPr>
+        </p:nvSpPr>
+        <p:spPr/>
+        <p:txBody>
+          <a:bodyPr/>
+          <a:lstStyle/>
+          <a:p>
+            <a:r>
+              <a:rPr lang="en-US" dirty="0" smtClean="0"/>
+              <a:t>Contains the main method which sets up everything and starts the application. It instantiates the master album and the GUI.</a:t>
+            </a:r>
+            <a:endParaRPr lang="en-US" dirty="0"/>
+          </a:p>
+        </p:txBody>
+      </p:sp>
+    </p:spTree>
+    <p:extLst>
+      <p:ext uri="{BB962C8B-B14F-4D97-AF65-F5344CB8AC3E}">
+        <p14:creationId xmlns:p14="http://schemas.microsoft.com/office/powerpoint/2010/main" val="3851650798"/>
+      </p:ext>
+    </p:extLst>
+  </p:cSld>
+  <p:clrMapOvr>
+    <a:masterClrMapping/>
+  </p:clrMapOvr>
+  <p:timing>
+    <p:tnLst>
+      <p:par>
+        <p:cTn id="1" dur="indefinite" restart="never" nodeType="tmRoot"/>
+      </p:par>
+    </p:tnLst>
+  </p:timing>
 </p:sld>
 </file>
 
@@ -3897,6 +3991,13 @@
   <p:clrMapOvr>
     <a:masterClrMapping/>
   </p:clrMapOvr>
+  <p:timing>
+    <p:tnLst>
+      <p:par>
+        <p:cTn id="1" dur="indefinite" restart="never" nodeType="tmRoot"/>
+      </p:par>
+    </p:tnLst>
+  </p:timing>
 </p:sld>
 </file>
 
@@ -4065,6 +4166,13 @@
   <p:clrMapOvr>
     <a:masterClrMapping/>
   </p:clrMapOvr>
+  <p:timing>
+    <p:tnLst>
+      <p:par>
+        <p:cTn id="1" dur="indefinite" restart="never" nodeType="tmRoot"/>
+      </p:par>
+    </p:tnLst>
+  </p:timing>
 </p:sld>
 </file>
 
@@ -4095,14 +4203,23 @@
             <p:ph type="title"/>
           </p:nvPr>
         </p:nvSpPr>
-        <p:spPr/>
-        <p:txBody>
-          <a:bodyPr/>
-          <a:lstStyle/>
-          <a:p>
-            <a:r>
-              <a:rPr lang="hr-HR" dirty="0" err="1" smtClean="0"/>
+        <p:spPr>
+          <a:xfrm>
+            <a:off x="467544" y="274638"/>
+            <a:ext cx="8219256" cy="1143000"/>
+          </a:xfrm>
+        </p:spPr>
+        <p:txBody>
+          <a:bodyPr/>
+          <a:lstStyle/>
+          <a:p>
+            <a:r>
+              <a:rPr lang="hr-HR" dirty="0" smtClean="0"/>
               <a:t>AlterCommands</a:t>
+            </a:r>
+            <a:r>
+              <a:rPr lang="en-US" dirty="0" smtClean="0"/>
+              <a:t> – Command Pattern</a:t>
             </a:r>
             <a:endParaRPr lang="hr-HR" dirty="0"/>
           </a:p>
@@ -4143,7 +4260,50 @@
           <a:p>
             <a:r>
               <a:rPr lang="en-US" dirty="0"/>
-              <a:t>The command and corresponding classes are: Crop, Flip, Mirror, Resize, Rotate and Search.</a:t>
+              <a:t>The </a:t>
+            </a:r>
+            <a:r>
+              <a:rPr lang="en-US" dirty="0" smtClean="0"/>
+              <a:t>commands </a:t>
+            </a:r>
+            <a:r>
+              <a:rPr lang="en-US" dirty="0"/>
+              <a:t>and corresponding classes are: Crop, Flip, Mirror, Resize, Rotate and Search.</a:t>
+            </a:r>
+          </a:p>
+          <a:p>
+            <a:r>
+              <a:rPr lang="en-US" dirty="0" smtClean="0"/>
+              <a:t>Command: </a:t>
+            </a:r>
+            <a:r>
+              <a:rPr lang="en-US" dirty="0" err="1" smtClean="0"/>
+              <a:t>AlterCommand</a:t>
+            </a:r>
+            <a:endParaRPr lang="en-US" dirty="0" smtClean="0"/>
+          </a:p>
+          <a:p>
+            <a:r>
+              <a:rPr lang="en-US" dirty="0" smtClean="0"/>
+              <a:t>Concrete Command: Resize</a:t>
+            </a:r>
+            <a:endParaRPr lang="en-US" dirty="0" smtClean="0"/>
+          </a:p>
+          <a:p>
+            <a:r>
+              <a:rPr lang="en-US" dirty="0" smtClean="0"/>
+              <a:t>Client/Invoker: </a:t>
+            </a:r>
+            <a:r>
+              <a:rPr lang="en-US" dirty="0" err="1" smtClean="0"/>
+              <a:t>ResizeAction</a:t>
+            </a:r>
+            <a:endParaRPr lang="en-US" dirty="0" smtClean="0"/>
+          </a:p>
+          <a:p>
+            <a:r>
+              <a:rPr lang="en-US" dirty="0" smtClean="0"/>
+              <a:t>Receiver: Picture</a:t>
             </a:r>
           </a:p>
           <a:p>
@@ -4161,6 +4321,13 @@
   <p:clrMapOvr>
     <a:masterClrMapping/>
   </p:clrMapOvr>
+  <p:timing>
+    <p:tnLst>
+      <p:par>
+        <p:cTn id="1" dur="indefinite" restart="never" nodeType="tmRoot"/>
+      </p:par>
+    </p:tnLst>
+  </p:timing>
 </p:sld>
 </file>
 
@@ -4191,78 +4358,85 @@
             <p:ph type="title"/>
           </p:nvPr>
         </p:nvSpPr>
-        <p:spPr/>
-        <p:txBody>
-          <a:bodyPr/>
-          <a:lstStyle/>
-          <a:p>
-            <a:r>
-              <a:rPr lang="hr-HR" dirty="0" err="1" smtClean="0"/>
-              <a:t>UndoRedo</a:t>
-            </a:r>
-            <a:endParaRPr lang="hr-HR" dirty="0"/>
-          </a:p>
-        </p:txBody>
-      </p:sp>
-      <p:sp>
-        <p:nvSpPr>
-          <p:cNvPr id="3" name="Content Placeholder 2"/>
-          <p:cNvSpPr>
-            <a:spLocks noGrp="1"/>
-          </p:cNvSpPr>
-          <p:nvPr>
-            <p:ph sz="quarter" idx="1"/>
-          </p:nvPr>
-        </p:nvSpPr>
-        <p:spPr/>
-        <p:txBody>
-          <a:bodyPr/>
-          <a:lstStyle/>
-          <a:p>
-            <a:r>
-              <a:rPr lang="en-US" dirty="0" err="1"/>
-              <a:t>BasicUndoRedoStack</a:t>
+        <p:spPr>
+          <a:xfrm>
+            <a:off x="467544" y="274638"/>
+            <a:ext cx="8219256" cy="1143000"/>
+          </a:xfrm>
+        </p:spPr>
+        <p:txBody>
+          <a:bodyPr/>
+          <a:lstStyle/>
+          <a:p>
+            <a:r>
+              <a:rPr lang="hr-HR" dirty="0"/>
+              <a:t>AlterCommands</a:t>
             </a:r>
             <a:r>
               <a:rPr lang="en-US" dirty="0"/>
-              <a:t> has a undo and redo stacks which store the commands which represent the changes made to the picture.</a:t>
-            </a:r>
-          </a:p>
-          <a:p>
-            <a:r>
-              <a:rPr lang="en-US" dirty="0"/>
-              <a:t>It has </a:t>
-            </a:r>
-            <a:r>
-              <a:rPr lang="en-US" dirty="0" err="1"/>
-              <a:t>undoPicture</a:t>
-            </a:r>
-            <a:r>
-              <a:rPr lang="en-US" dirty="0"/>
-              <a:t> and </a:t>
-            </a:r>
-            <a:r>
-              <a:rPr lang="en-US" dirty="0" err="1"/>
-              <a:t>redoPicture</a:t>
-            </a:r>
-            <a:r>
-              <a:rPr lang="en-US" dirty="0"/>
-              <a:t> methods.</a:t>
-            </a:r>
-            <a:endParaRPr lang="hr-HR" dirty="0"/>
-          </a:p>
-        </p:txBody>
-      </p:sp>
+              <a:t> – Command Pattern</a:t>
+            </a:r>
+          </a:p>
+        </p:txBody>
+      </p:sp>
+      <p:pic>
+        <p:nvPicPr>
+          <p:cNvPr id="1028" name="Picture 4" descr="C:\Users\Panca\Downloads\ImageAlbumCommandPattern - New Page.png"/>
+          <p:cNvPicPr>
+            <a:picLocks noChangeAspect="1" noChangeArrowheads="1"/>
+          </p:cNvPicPr>
+          <p:nvPr/>
+        </p:nvPicPr>
+        <p:blipFill>
+          <a:blip r:embed="rId2" cstate="print">
+            <a:extLst>
+              <a:ext uri="{28A0092B-C50C-407E-A947-70E740481C1C}">
+                <a14:useLocalDpi xmlns:a14="http://schemas.microsoft.com/office/drawing/2010/main" val="0"/>
+              </a:ext>
+            </a:extLst>
+          </a:blip>
+          <a:srcRect/>
+          <a:stretch>
+            <a:fillRect/>
+          </a:stretch>
+        </p:blipFill>
+        <p:spPr bwMode="auto">
+          <a:xfrm>
+            <a:off x="395536" y="1772816"/>
+            <a:ext cx="8568952" cy="4320480"/>
+          </a:xfrm>
+          <a:prstGeom prst="rect">
+            <a:avLst/>
+          </a:prstGeom>
+          <a:noFill/>
+          <a:extLst>
+            <a:ext uri="{909E8E84-426E-40DD-AFC4-6F175D3DCCD1}">
+              <a14:hiddenFill xmlns:a14="http://schemas.microsoft.com/office/drawing/2010/main">
+                <a:solidFill>
+                  <a:srgbClr val="FFFFFF"/>
+                </a:solidFill>
+              </a14:hiddenFill>
+            </a:ext>
+          </a:extLst>
+        </p:spPr>
+      </p:pic>
     </p:spTree>
     <p:extLst>
       <p:ext uri="{BB962C8B-B14F-4D97-AF65-F5344CB8AC3E}">
-        <p14:creationId xmlns:p14="http://schemas.microsoft.com/office/powerpoint/2010/main" val="2690105239"/>
+        <p14:creationId xmlns:p14="http://schemas.microsoft.com/office/powerpoint/2010/main" val="994131419"/>
       </p:ext>
     </p:extLst>
   </p:cSld>
   <p:clrMapOvr>
     <a:masterClrMapping/>
   </p:clrMapOvr>
+  <p:timing>
+    <p:tnLst>
+      <p:par>
+        <p:cTn id="1" dur="indefinite" restart="never" nodeType="tmRoot"/>
+      </p:par>
+    </p:tnLst>
+  </p:timing>
 </p:sld>
 </file>
 
@@ -4299,6 +4473,115 @@
           <a:lstStyle/>
           <a:p>
             <a:r>
+              <a:rPr lang="hr-HR" dirty="0" err="1" smtClean="0"/>
+              <a:t>UndoRedo</a:t>
+            </a:r>
+            <a:endParaRPr lang="hr-HR" dirty="0"/>
+          </a:p>
+        </p:txBody>
+      </p:sp>
+      <p:sp>
+        <p:nvSpPr>
+          <p:cNvPr id="3" name="Content Placeholder 2"/>
+          <p:cNvSpPr>
+            <a:spLocks noGrp="1"/>
+          </p:cNvSpPr>
+          <p:nvPr>
+            <p:ph sz="quarter" idx="1"/>
+          </p:nvPr>
+        </p:nvSpPr>
+        <p:spPr/>
+        <p:txBody>
+          <a:bodyPr/>
+          <a:lstStyle/>
+          <a:p>
+            <a:r>
+              <a:rPr lang="en-US" dirty="0" err="1"/>
+              <a:t>BasicUndoRedoStack</a:t>
+            </a:r>
+            <a:r>
+              <a:rPr lang="en-US" dirty="0"/>
+              <a:t> has a undo and redo stacks which store the commands which represent the changes made to the picture.</a:t>
+            </a:r>
+          </a:p>
+          <a:p>
+            <a:r>
+              <a:rPr lang="en-US" dirty="0"/>
+              <a:t>It has </a:t>
+            </a:r>
+            <a:r>
+              <a:rPr lang="en-US" dirty="0" err="1"/>
+              <a:t>undoPicture</a:t>
+            </a:r>
+            <a:r>
+              <a:rPr lang="en-US" dirty="0"/>
+              <a:t> and </a:t>
+            </a:r>
+            <a:r>
+              <a:rPr lang="en-US" dirty="0" err="1"/>
+              <a:t>redoPicture</a:t>
+            </a:r>
+            <a:r>
+              <a:rPr lang="en-US" dirty="0"/>
+              <a:t> methods.</a:t>
+            </a:r>
+            <a:endParaRPr lang="hr-HR" dirty="0"/>
+          </a:p>
+        </p:txBody>
+      </p:sp>
+    </p:spTree>
+    <p:extLst>
+      <p:ext uri="{BB962C8B-B14F-4D97-AF65-F5344CB8AC3E}">
+        <p14:creationId xmlns:p14="http://schemas.microsoft.com/office/powerpoint/2010/main" val="2690105239"/>
+      </p:ext>
+    </p:extLst>
+  </p:cSld>
+  <p:clrMapOvr>
+    <a:masterClrMapping/>
+  </p:clrMapOvr>
+  <p:timing>
+    <p:tnLst>
+      <p:par>
+        <p:cTn id="1" dur="indefinite" restart="never" nodeType="tmRoot"/>
+      </p:par>
+    </p:tnLst>
+  </p:timing>
+</p:sld>
+</file>
+
+<file path=ppt/slides/slide7.xml><?xml version="1.0" encoding="utf-8"?>
+<p:sld xmlns:a="http://schemas.openxmlformats.org/drawingml/2006/main" xmlns:r="http://schemas.openxmlformats.org/officeDocument/2006/relationships" xmlns:p="http://schemas.openxmlformats.org/presentationml/2006/main">
+  <p:cSld>
+    <p:spTree>
+      <p:nvGrpSpPr>
+        <p:cNvPr id="1" name=""/>
+        <p:cNvGrpSpPr/>
+        <p:nvPr/>
+      </p:nvGrpSpPr>
+      <p:grpSpPr>
+        <a:xfrm>
+          <a:off x="0" y="0"/>
+          <a:ext cx="0" cy="0"/>
+          <a:chOff x="0" y="0"/>
+          <a:chExt cx="0" cy="0"/>
+        </a:xfrm>
+      </p:grpSpPr>
+      <p:sp>
+        <p:nvSpPr>
+          <p:cNvPr id="2" name="Title 1"/>
+          <p:cNvSpPr>
+            <a:spLocks noGrp="1"/>
+          </p:cNvSpPr>
+          <p:nvPr>
+            <p:ph type="title"/>
+          </p:nvPr>
+        </p:nvSpPr>
+        <p:spPr/>
+        <p:txBody>
+          <a:bodyPr/>
+          <a:lstStyle/>
+          <a:p>
+            <a:r>
               <a:rPr lang="hr-HR" dirty="0" smtClean="0"/>
               <a:t>GUI</a:t>
             </a:r>
@@ -4319,7 +4602,7 @@
         <p:spPr/>
         <p:txBody>
           <a:bodyPr>
-            <a:normAutofit fontScale="85000" lnSpcReduction="20000"/>
+            <a:normAutofit fontScale="92500" lnSpcReduction="20000"/>
           </a:bodyPr>
           <a:lstStyle/>
           <a:p>
@@ -4388,16 +4671,60 @@
               <a:t>example the class </a:t>
             </a:r>
             <a:r>
-              <a:rPr lang="en-US" dirty="0" err="1"/>
+              <a:rPr lang="en-US" dirty="0" err="1" smtClean="0"/>
               <a:t>CropAction</a:t>
             </a:r>
             <a:r>
+              <a:rPr lang="en-US" dirty="0" smtClean="0"/>
+              <a:t> retains </a:t>
+            </a:r>
+            <a:r>
               <a:rPr lang="en-US" dirty="0"/>
-              <a:t>, it retains a reference to the GUI </a:t>
+              <a:t>a reference to the GUI </a:t>
             </a:r>
             <a:r>
               <a:rPr lang="en-US" dirty="0" smtClean="0"/>
-              <a:t>and</a:t>
+              <a:t>and </a:t>
+            </a:r>
+            <a:r>
+              <a:rPr lang="en-US" dirty="0"/>
+              <a:t>instantiates the Crop class and calls its execute method on the </a:t>
+            </a:r>
+            <a:r>
+              <a:rPr lang="en-US" dirty="0" smtClean="0"/>
+              <a:t>pic</a:t>
+            </a:r>
+            <a:r>
+              <a:rPr lang="hr-HR" dirty="0" smtClean="0"/>
+              <a:t>tu</a:t>
+            </a:r>
+            <a:r>
+              <a:rPr lang="en-US" dirty="0" smtClean="0"/>
+              <a:t>re </a:t>
+            </a:r>
+            <a:r>
+              <a:rPr lang="en-US" dirty="0"/>
+              <a:t>that is </a:t>
+            </a:r>
+            <a:r>
+              <a:rPr lang="en-US" dirty="0" smtClean="0"/>
+              <a:t>current</a:t>
+            </a:r>
+            <a:r>
+              <a:rPr lang="hr-HR" dirty="0" smtClean="0"/>
+              <a:t>l</a:t>
+            </a:r>
+            <a:r>
+              <a:rPr lang="en-US" dirty="0" smtClean="0"/>
+              <a:t>y </a:t>
+            </a:r>
+            <a:r>
+              <a:rPr lang="en-US" dirty="0"/>
+              <a:t>being edited </a:t>
+            </a:r>
+            <a:r>
+              <a:rPr lang="en-US" dirty="0" smtClean="0"/>
+              <a:t>which</a:t>
             </a:r>
             <a:r>
               <a:rPr lang="hr-HR" dirty="0" smtClean="0"/>
@@ -4405,54 +4732,6 @@
             </a:r>
             <a:r>
               <a:rPr lang="en-US" dirty="0" smtClean="0"/>
-              <a:t>It </a:t>
-            </a:r>
-            <a:r>
-              <a:rPr lang="en-US" dirty="0"/>
-              <a:t>instantiates the Crop class and calls its execute method on the </a:t>
-            </a:r>
-            <a:r>
-              <a:rPr lang="en-US" dirty="0" smtClean="0"/>
-              <a:t>pic</a:t>
-            </a:r>
-            <a:r>
-              <a:rPr lang="hr-HR" dirty="0" smtClean="0"/>
-              <a:t>tu</a:t>
-            </a:r>
-            <a:r>
-              <a:rPr lang="en-US" dirty="0" smtClean="0"/>
-              <a:t>re </a:t>
-            </a:r>
-            <a:r>
-              <a:rPr lang="en-US" dirty="0"/>
-              <a:t>that is </a:t>
-            </a:r>
-            <a:r>
-              <a:rPr lang="en-US" dirty="0" smtClean="0"/>
-              <a:t>current</a:t>
-            </a:r>
-            <a:r>
-              <a:rPr lang="hr-HR" dirty="0" smtClean="0"/>
-              <a:t>l</a:t>
-            </a:r>
-            <a:r>
-              <a:rPr lang="en-US" dirty="0" smtClean="0"/>
-              <a:t>y </a:t>
-            </a:r>
-            <a:r>
-              <a:rPr lang="en-US" dirty="0"/>
-              <a:t>being edited </a:t>
-            </a:r>
-            <a:r>
-              <a:rPr lang="en-US" dirty="0" smtClean="0"/>
-              <a:t>which</a:t>
-            </a:r>
-            <a:r>
-              <a:rPr lang="hr-HR" dirty="0" smtClean="0"/>
-              <a:t> </a:t>
-            </a:r>
-            <a:r>
-              <a:rPr lang="en-US" dirty="0" smtClean="0"/>
               <a:t>is </a:t>
             </a:r>
             <a:r>
@@ -4484,29 +4763,15 @@
             </a:r>
             <a:r>
               <a:rPr lang="en-US" dirty="0"/>
-              <a:t>and it adds the crop</a:t>
-            </a:r>
-          </a:p>
-          <a:p>
+              <a:t>and it adds the </a:t>
+            </a:r>
+            <a:r>
+              <a:rPr lang="en-US" dirty="0" smtClean="0"/>
+              <a:t>crop to </a:t>
+            </a:r>
             <a:r>
               <a:rPr lang="en-US" dirty="0"/>
-              <a:t>to the undo/redo stack. This is Observer pattern. So in this case the Picture is Observable and the GUI is the Observer because it needs to update </a:t>
-            </a:r>
-            <a:r>
-              <a:rPr lang="en-US" dirty="0" smtClean="0"/>
-              <a:t>the</a:t>
-            </a:r>
-            <a:r>
-              <a:rPr lang="hr-HR" dirty="0" smtClean="0"/>
-              <a:t> </a:t>
-            </a:r>
-            <a:r>
-              <a:rPr lang="en-US" dirty="0" smtClean="0"/>
-              <a:t>screen </a:t>
-            </a:r>
-            <a:r>
-              <a:rPr lang="en-US" dirty="0"/>
-              <a:t>when a change happens to a picture.</a:t>
+              <a:t>the undo/redo stack. </a:t>
             </a:r>
             <a:endParaRPr lang="hr-HR" dirty="0"/>
           </a:p>
@@ -4522,6 +4787,246 @@
   <p:clrMapOvr>
     <a:masterClrMapping/>
   </p:clrMapOvr>
+  <p:timing>
+    <p:tnLst>
+      <p:par>
+        <p:cTn id="1" dur="indefinite" restart="never" nodeType="tmRoot"/>
+      </p:par>
+    </p:tnLst>
+  </p:timing>
+</p:sld>
+</file>
+
+<file path=ppt/slides/slide8.xml><?xml version="1.0" encoding="utf-8"?>
+<p:sld xmlns:a="http://schemas.openxmlformats.org/drawingml/2006/main" xmlns:r="http://schemas.openxmlformats.org/officeDocument/2006/relationships" xmlns:p="http://schemas.openxmlformats.org/presentationml/2006/main">
+  <p:cSld>
+    <p:spTree>
+      <p:nvGrpSpPr>
+        <p:cNvPr id="1" name=""/>
+        <p:cNvGrpSpPr/>
+        <p:nvPr/>
+      </p:nvGrpSpPr>
+      <p:grpSpPr>
+        <a:xfrm>
+          <a:off x="0" y="0"/>
+          <a:ext cx="0" cy="0"/>
+          <a:chOff x="0" y="0"/>
+          <a:chExt cx="0" cy="0"/>
+        </a:xfrm>
+      </p:grpSpPr>
+      <p:sp>
+        <p:nvSpPr>
+          <p:cNvPr id="2" name="Title 1"/>
+          <p:cNvSpPr>
+            <a:spLocks noGrp="1"/>
+          </p:cNvSpPr>
+          <p:nvPr>
+            <p:ph type="title"/>
+          </p:nvPr>
+        </p:nvSpPr>
+        <p:spPr/>
+        <p:txBody>
+          <a:bodyPr/>
+          <a:lstStyle/>
+          <a:p>
+            <a:r>
+              <a:rPr lang="en-US" dirty="0" smtClean="0"/>
+              <a:t>GUI – Observer Pattern</a:t>
+            </a:r>
+            <a:endParaRPr lang="en-US" dirty="0"/>
+          </a:p>
+        </p:txBody>
+      </p:sp>
+      <p:sp>
+        <p:nvSpPr>
+          <p:cNvPr id="3" name="Content Placeholder 2"/>
+          <p:cNvSpPr>
+            <a:spLocks noGrp="1"/>
+          </p:cNvSpPr>
+          <p:nvPr>
+            <p:ph sz="quarter" idx="1"/>
+          </p:nvPr>
+        </p:nvSpPr>
+        <p:spPr/>
+        <p:txBody>
+          <a:bodyPr/>
+          <a:lstStyle/>
+          <a:p>
+            <a:r>
+              <a:rPr lang="en-US" dirty="0" smtClean="0"/>
+              <a:t>In this </a:t>
+            </a:r>
+            <a:r>
+              <a:rPr lang="en-US" dirty="0"/>
+              <a:t>case the Picture is Observable and the GUI is the </a:t>
+            </a:r>
+            <a:r>
+              <a:rPr lang="en-US" dirty="0" smtClean="0"/>
+              <a:t>Observer</a:t>
+            </a:r>
+          </a:p>
+          <a:p>
+            <a:r>
+              <a:rPr lang="en-US" dirty="0" smtClean="0"/>
+              <a:t>GUI </a:t>
+            </a:r>
+            <a:r>
+              <a:rPr lang="en-US" dirty="0"/>
+              <a:t>needs to update the</a:t>
+            </a:r>
+            <a:r>
+              <a:rPr lang="hr-HR" dirty="0"/>
+              <a:t> </a:t>
+            </a:r>
+            <a:r>
+              <a:rPr lang="en-US" dirty="0"/>
+              <a:t>screen when a change happens to a picture</a:t>
+            </a:r>
+            <a:r>
+              <a:rPr lang="en-US" dirty="0" smtClean="0"/>
+              <a:t>. For example when the Crop command makes changes to the picture it uses the Picture’s </a:t>
+            </a:r>
+            <a:r>
+              <a:rPr lang="en-US" dirty="0" err="1" smtClean="0"/>
+              <a:t>setImage</a:t>
+            </a:r>
+            <a:r>
+              <a:rPr lang="en-US" dirty="0" smtClean="0"/>
+              <a:t>() method which notifies the observers – in our case the GUI class</a:t>
+            </a:r>
+          </a:p>
+          <a:p>
+            <a:r>
+              <a:rPr lang="en-US" dirty="0" smtClean="0"/>
+              <a:t>We are using standard java Observable class and Observer interface</a:t>
+            </a:r>
+          </a:p>
+          <a:p>
+            <a:r>
+              <a:rPr lang="en-US" dirty="0" smtClean="0"/>
+              <a:t>Concrete subject: Picture</a:t>
+            </a:r>
+          </a:p>
+          <a:p>
+            <a:r>
+              <a:rPr lang="en-US" dirty="0" smtClean="0"/>
+              <a:t>Concrete observer: GUI</a:t>
+            </a:r>
+          </a:p>
+          <a:p>
+            <a:endParaRPr lang="hr-HR" dirty="0"/>
+          </a:p>
+          <a:p>
+            <a:endParaRPr lang="en-US" dirty="0"/>
+          </a:p>
+        </p:txBody>
+      </p:sp>
+    </p:spTree>
+    <p:extLst>
+      <p:ext uri="{BB962C8B-B14F-4D97-AF65-F5344CB8AC3E}">
+        <p14:creationId xmlns:p14="http://schemas.microsoft.com/office/powerpoint/2010/main" val="700852850"/>
+      </p:ext>
+    </p:extLst>
+  </p:cSld>
+  <p:clrMapOvr>
+    <a:masterClrMapping/>
+  </p:clrMapOvr>
+  <p:timing>
+    <p:tnLst>
+      <p:par>
+        <p:cTn id="1" dur="indefinite" restart="never" nodeType="tmRoot"/>
+      </p:par>
+    </p:tnLst>
+  </p:timing>
+</p:sld>
+</file>
+
+<file path=ppt/slides/slide9.xml><?xml version="1.0" encoding="utf-8"?>
+<p:sld xmlns:a="http://schemas.openxmlformats.org/drawingml/2006/main" xmlns:r="http://schemas.openxmlformats.org/officeDocument/2006/relationships" xmlns:p="http://schemas.openxmlformats.org/presentationml/2006/main">
+  <p:cSld>
+    <p:spTree>
+      <p:nvGrpSpPr>
+        <p:cNvPr id="1" name=""/>
+        <p:cNvGrpSpPr/>
+        <p:nvPr/>
+      </p:nvGrpSpPr>
+      <p:grpSpPr>
+        <a:xfrm>
+          <a:off x="0" y="0"/>
+          <a:ext cx="0" cy="0"/>
+          <a:chOff x="0" y="0"/>
+          <a:chExt cx="0" cy="0"/>
+        </a:xfrm>
+      </p:grpSpPr>
+      <p:sp>
+        <p:nvSpPr>
+          <p:cNvPr id="2" name="Title 1"/>
+          <p:cNvSpPr>
+            <a:spLocks noGrp="1"/>
+          </p:cNvSpPr>
+          <p:nvPr>
+            <p:ph type="title"/>
+          </p:nvPr>
+        </p:nvSpPr>
+        <p:spPr/>
+        <p:txBody>
+          <a:bodyPr/>
+          <a:lstStyle/>
+          <a:p>
+            <a:r>
+              <a:rPr lang="en-US" dirty="0"/>
+              <a:t>GUI – Observer Pattern</a:t>
+            </a:r>
+          </a:p>
+        </p:txBody>
+      </p:sp>
+      <p:pic>
+        <p:nvPicPr>
+          <p:cNvPr id="4" name="Picture 3"/>
+          <p:cNvPicPr>
+            <a:picLocks noChangeAspect="1"/>
+          </p:cNvPicPr>
+          <p:nvPr/>
+        </p:nvPicPr>
+        <p:blipFill>
+          <a:blip r:embed="rId2" cstate="print">
+            <a:extLst>
+              <a:ext uri="{28A0092B-C50C-407E-A947-70E740481C1C}">
+                <a14:useLocalDpi xmlns:a14="http://schemas.microsoft.com/office/drawing/2010/main" val="0"/>
+              </a:ext>
+            </a:extLst>
+          </a:blip>
+          <a:stretch>
+            <a:fillRect/>
+          </a:stretch>
+        </p:blipFill>
+        <p:spPr>
+          <a:xfrm>
+            <a:off x="179512" y="1268760"/>
+            <a:ext cx="8784976" cy="5438898"/>
+          </a:xfrm>
+          <a:prstGeom prst="rect">
+            <a:avLst/>
+          </a:prstGeom>
+        </p:spPr>
+      </p:pic>
+    </p:spTree>
+    <p:extLst>
+      <p:ext uri="{BB962C8B-B14F-4D97-AF65-F5344CB8AC3E}">
+        <p14:creationId xmlns:p14="http://schemas.microsoft.com/office/powerpoint/2010/main" val="1203139445"/>
+      </p:ext>
+    </p:extLst>
+  </p:cSld>
+  <p:clrMapOvr>
+    <a:masterClrMapping/>
+  </p:clrMapOvr>
+  <p:timing>
+    <p:tnLst>
+      <p:par>
+        <p:cTn id="1" dur="indefinite" restart="never" nodeType="tmRoot"/>
+      </p:par>
+    </p:tnLst>
+  </p:timing>
 </p:sld>
 </file>
 

</xml_diff>